<commit_message>
updated Datenmodell, added architecture content
</commit_message>
<xml_diff>
--- a/ProfTeX.pptx
+++ b/ProfTeX.pptx
@@ -8,13 +8,14 @@
     <p:sldId id="256" r:id="rId2"/>
     <p:sldId id="265" r:id="rId3"/>
     <p:sldId id="257" r:id="rId4"/>
-    <p:sldId id="262" r:id="rId5"/>
-    <p:sldId id="258" r:id="rId6"/>
-    <p:sldId id="261" r:id="rId7"/>
-    <p:sldId id="259" r:id="rId8"/>
-    <p:sldId id="263" r:id="rId9"/>
-    <p:sldId id="260" r:id="rId10"/>
-    <p:sldId id="264" r:id="rId11"/>
+    <p:sldId id="266" r:id="rId5"/>
+    <p:sldId id="262" r:id="rId6"/>
+    <p:sldId id="258" r:id="rId7"/>
+    <p:sldId id="261" r:id="rId8"/>
+    <p:sldId id="259" r:id="rId9"/>
+    <p:sldId id="263" r:id="rId10"/>
+    <p:sldId id="260" r:id="rId11"/>
+    <p:sldId id="264" r:id="rId12"/>
   </p:sldIdLst>
   <p:sldSz cx="9144000" cy="6858000" type="screen4x3"/>
   <p:notesSz cx="6858000" cy="9144000"/>
@@ -113,6 +114,22 @@
       </a:defRPr>
     </a:lvl9pPr>
   </p:defaultTextStyle>
+  <p:extLst>
+    <p:ext uri="{EFAFB233-063F-42B5-8137-9DF3F51BA10A}">
+      <p15:sldGuideLst xmlns:p15="http://schemas.microsoft.com/office/powerpoint/2012/main">
+        <p15:guide id="1" orient="horz" pos="2160">
+          <p15:clr>
+            <a:srgbClr val="A4A3A4"/>
+          </p15:clr>
+        </p15:guide>
+        <p15:guide id="2" pos="2880">
+          <p15:clr>
+            <a:srgbClr val="A4A3A4"/>
+          </p15:clr>
+        </p15:guide>
+      </p15:sldGuideLst>
+    </p:ext>
+  </p:extLst>
 </p:presentation>
 </file>
 
@@ -3339,6 +3356,107 @@
           <a:p>
             <a:r>
               <a:rPr lang="de-DE" dirty="0" smtClean="0"/>
+              <a:t>Usability</a:t>
+            </a:r>
+            <a:endParaRPr lang="de-DE" dirty="0"/>
+          </a:p>
+        </p:txBody>
+      </p:sp>
+      <p:sp>
+        <p:nvSpPr>
+          <p:cNvPr id="3" name="Inhaltsplatzhalter 2"/>
+          <p:cNvSpPr>
+            <a:spLocks noGrp="1"/>
+          </p:cNvSpPr>
+          <p:nvPr>
+            <p:ph idx="1"/>
+          </p:nvPr>
+        </p:nvSpPr>
+        <p:spPr/>
+        <p:txBody>
+          <a:bodyPr/>
+          <a:lstStyle/>
+          <a:p>
+            <a:r>
+              <a:rPr lang="de-DE" dirty="0" smtClean="0"/>
+              <a:t>Einheitliches Design</a:t>
+            </a:r>
+          </a:p>
+          <a:p>
+            <a:r>
+              <a:rPr lang="de-DE" dirty="0" smtClean="0"/>
+              <a:t>Übersichtlichkeit</a:t>
+            </a:r>
+          </a:p>
+          <a:p>
+            <a:r>
+              <a:rPr lang="de-DE" dirty="0" smtClean="0"/>
+              <a:t>Einfachheit</a:t>
+            </a:r>
+          </a:p>
+          <a:p>
+            <a:r>
+              <a:rPr lang="de-DE" dirty="0" smtClean="0"/>
+              <a:t>Schnelle Reaktionszeiten über AJAX</a:t>
+            </a:r>
+            <a:endParaRPr lang="de-DE" dirty="0"/>
+          </a:p>
+        </p:txBody>
+      </p:sp>
+    </p:spTree>
+    <p:extLst>
+      <p:ext uri="{BB962C8B-B14F-4D97-AF65-F5344CB8AC3E}">
+        <p14:creationId xmlns:p14="http://schemas.microsoft.com/office/powerpoint/2010/main" val="1418243256"/>
+      </p:ext>
+    </p:extLst>
+  </p:cSld>
+  <p:clrMapOvr>
+    <a:masterClrMapping/>
+  </p:clrMapOvr>
+  <p:timing>
+    <p:tnLst>
+      <p:par>
+        <p:cTn id="1" dur="indefinite" restart="never" nodeType="tmRoot"/>
+      </p:par>
+    </p:tnLst>
+  </p:timing>
+</p:sld>
+</file>
+
+<file path=ppt/slides/slide11.xml><?xml version="1.0" encoding="utf-8"?>
+<p:sld xmlns:a="http://schemas.openxmlformats.org/drawingml/2006/main" xmlns:r="http://schemas.openxmlformats.org/officeDocument/2006/relationships" xmlns:p="http://schemas.openxmlformats.org/presentationml/2006/main">
+  <p:cSld>
+    <p:spTree>
+      <p:nvGrpSpPr>
+        <p:cNvPr id="1" name=""/>
+        <p:cNvGrpSpPr/>
+        <p:nvPr/>
+      </p:nvGrpSpPr>
+      <p:grpSpPr>
+        <a:xfrm>
+          <a:off x="0" y="0"/>
+          <a:ext cx="0" cy="0"/>
+          <a:chOff x="0" y="0"/>
+          <a:chExt cx="0" cy="0"/>
+        </a:xfrm>
+      </p:grpSpPr>
+      <p:sp>
+        <p:nvSpPr>
+          <p:cNvPr id="2" name="Titel 1"/>
+          <p:cNvSpPr>
+            <a:spLocks noGrp="1"/>
+          </p:cNvSpPr>
+          <p:nvPr>
+            <p:ph type="title"/>
+          </p:nvPr>
+        </p:nvSpPr>
+        <p:spPr/>
+        <p:txBody>
+          <a:bodyPr/>
+          <a:lstStyle/>
+          <a:p>
+            <a:r>
+              <a:rPr lang="de-DE" dirty="0" smtClean="0"/>
               <a:t>Demo</a:t>
             </a:r>
             <a:endParaRPr lang="de-DE" dirty="0"/>
@@ -3531,25 +3649,32 @@
           </a:p>
         </p:txBody>
       </p:sp>
-      <p:sp>
-        <p:nvSpPr>
-          <p:cNvPr id="3" name="Inhaltsplatzhalter 2"/>
-          <p:cNvSpPr>
-            <a:spLocks noGrp="1"/>
-          </p:cNvSpPr>
+      <p:pic>
+        <p:nvPicPr>
+          <p:cNvPr id="4" name="Inhaltsplatzhalter 3"/>
+          <p:cNvPicPr>
+            <a:picLocks noGrp="1" noChangeAspect="1"/>
+          </p:cNvPicPr>
           <p:nvPr>
             <p:ph idx="1"/>
           </p:nvPr>
-        </p:nvSpPr>
-        <p:spPr/>
-        <p:txBody>
-          <a:bodyPr/>
-          <a:lstStyle/>
-          <a:p>
-            <a:endParaRPr lang="de-DE" dirty="0"/>
-          </a:p>
-        </p:txBody>
-      </p:sp>
+        </p:nvPicPr>
+        <p:blipFill>
+          <a:blip r:embed="rId2"/>
+          <a:stretch>
+            <a:fillRect/>
+          </a:stretch>
+        </p:blipFill>
+        <p:spPr>
+          <a:xfrm>
+            <a:off x="1406854" y="1916113"/>
+            <a:ext cx="6330292" cy="4210050"/>
+          </a:xfrm>
+          <a:prstGeom prst="rect">
+            <a:avLst/>
+          </a:prstGeom>
+        </p:spPr>
+      </p:pic>
     </p:spTree>
     <p:extLst>
       <p:ext uri="{BB962C8B-B14F-4D97-AF65-F5344CB8AC3E}">
@@ -3599,14 +3724,12 @@
         </p:nvSpPr>
         <p:spPr/>
         <p:txBody>
-          <a:bodyPr>
-            <a:normAutofit/>
-          </a:bodyPr>
+          <a:bodyPr/>
           <a:lstStyle/>
           <a:p>
             <a:r>
               <a:rPr lang="de-DE" dirty="0" smtClean="0"/>
-              <a:t>Architektur</a:t>
+              <a:t>Architektur - MVC</a:t>
             </a:r>
             <a:endParaRPr lang="de-DE" dirty="0"/>
           </a:p>
@@ -3627,6 +3750,37 @@
           <a:bodyPr/>
           <a:lstStyle/>
           <a:p>
+            <a:r>
+              <a:rPr lang="de-DE" dirty="0" smtClean="0"/>
+              <a:t>div. Views, alle „</a:t>
+            </a:r>
+            <a:r>
+              <a:rPr lang="de-DE" dirty="0" err="1" smtClean="0"/>
+              <a:t>thin</a:t>
+            </a:r>
+            <a:r>
+              <a:rPr lang="de-DE" dirty="0" smtClean="0"/>
+              <a:t>“, mit einer Ausnahme:</a:t>
+            </a:r>
+          </a:p>
+          <a:p>
+            <a:pPr lvl="1"/>
+            <a:r>
+              <a:rPr lang="de-DE" dirty="0" err="1" smtClean="0"/>
+              <a:t>document_create</a:t>
+            </a:r>
+            <a:r>
+              <a:rPr lang="de-DE" dirty="0" smtClean="0"/>
+              <a:t>, zentrale View mit AJAX über </a:t>
+            </a:r>
+            <a:r>
+              <a:rPr lang="de-DE" dirty="0" err="1" smtClean="0"/>
+              <a:t>RESTful</a:t>
+            </a:r>
+            <a:r>
+              <a:rPr lang="de-DE" dirty="0" smtClean="0"/>
+              <a:t> API</a:t>
+            </a:r>
             <a:endParaRPr lang="de-DE" dirty="0"/>
           </a:p>
         </p:txBody>
@@ -3634,7 +3788,7 @@
     </p:spTree>
     <p:extLst>
       <p:ext uri="{BB962C8B-B14F-4D97-AF65-F5344CB8AC3E}">
-        <p14:creationId xmlns:p14="http://schemas.microsoft.com/office/powerpoint/2010/main" val="1701891748"/>
+        <p14:creationId xmlns:p14="http://schemas.microsoft.com/office/powerpoint/2010/main" val="2656433825"/>
       </p:ext>
     </p:extLst>
   </p:cSld>
@@ -3680,12 +3834,14 @@
         </p:nvSpPr>
         <p:spPr/>
         <p:txBody>
-          <a:bodyPr/>
+          <a:bodyPr>
+            <a:normAutofit/>
+          </a:bodyPr>
           <a:lstStyle/>
           <a:p>
             <a:r>
               <a:rPr lang="de-DE" dirty="0" smtClean="0"/>
-              <a:t>Persistenz - Datenbankmodell</a:t>
+              <a:t>Architektur</a:t>
             </a:r>
             <a:endParaRPr lang="de-DE" dirty="0"/>
           </a:p>
@@ -3707,65 +3863,23 @@
           <a:lstStyle/>
           <a:p>
             <a:r>
+              <a:rPr lang="de-DE" dirty="0" smtClean="0"/>
+              <a:t>Tomcat7</a:t>
+            </a:r>
+          </a:p>
+          <a:p>
+            <a:r>
               <a:rPr lang="de-DE" dirty="0" err="1" smtClean="0"/>
-              <a:t>Mwb</a:t>
-            </a:r>
-            <a:r>
-              <a:rPr lang="de-DE" dirty="0"/>
-              <a:t> </a:t>
-            </a:r>
-            <a:r>
-              <a:rPr lang="de-DE" dirty="0" smtClean="0"/>
-              <a:t>-&gt; Screenshot</a:t>
-            </a:r>
-          </a:p>
-        </p:txBody>
-      </p:sp>
-      <p:pic>
-        <p:nvPicPr>
-          <p:cNvPr id="4" name="Picture 2" descr="C:\Users\admin\Google Drive\Studium\Studium\4 Semester\Web-Engineering 2\ProfTex\mockup\screenshot_datenmodell.png"/>
-          <p:cNvPicPr>
-            <a:picLocks noChangeAspect="1" noChangeArrowheads="1"/>
-          </p:cNvPicPr>
-          <p:nvPr/>
-        </p:nvPicPr>
-        <p:blipFill>
-          <a:blip r:embed="rId2">
-            <a:extLst>
-              <a:ext uri="{28A0092B-C50C-407E-A947-70E740481C1C}">
-                <a14:useLocalDpi xmlns:a14="http://schemas.microsoft.com/office/drawing/2010/main" val="0"/>
-              </a:ext>
-            </a:extLst>
-          </a:blip>
-          <a:srcRect/>
-          <a:stretch>
-            <a:fillRect/>
-          </a:stretch>
-        </p:blipFill>
-        <p:spPr bwMode="auto">
-          <a:xfrm>
-            <a:off x="-36512" y="2008981"/>
-            <a:ext cx="9180512" cy="3727498"/>
-          </a:xfrm>
-          <a:prstGeom prst="rect">
-            <a:avLst/>
-          </a:prstGeom>
-          <a:noFill/>
-          <a:extLst>
-            <a:ext uri="{909E8E84-426E-40DD-AFC4-6F175D3DCCD1}">
-              <a14:hiddenFill xmlns:a14="http://schemas.microsoft.com/office/drawing/2010/main">
-                <a:solidFill>
-                  <a:srgbClr val="FFFFFF"/>
-                </a:solidFill>
-              </a14:hiddenFill>
-            </a:ext>
-          </a:extLst>
-        </p:spPr>
-      </p:pic>
+              <a:t>mySQL</a:t>
+            </a:r>
+            <a:endParaRPr lang="de-DE" dirty="0"/>
+          </a:p>
+        </p:txBody>
+      </p:sp>
     </p:spTree>
     <p:extLst>
       <p:ext uri="{BB962C8B-B14F-4D97-AF65-F5344CB8AC3E}">
-        <p14:creationId xmlns:p14="http://schemas.microsoft.com/office/powerpoint/2010/main" val="3132773705"/>
+        <p14:creationId xmlns:p14="http://schemas.microsoft.com/office/powerpoint/2010/main" val="1701891748"/>
       </p:ext>
     </p:extLst>
   </p:cSld>
@@ -3811,14 +3925,12 @@
         </p:nvSpPr>
         <p:spPr/>
         <p:txBody>
-          <a:bodyPr>
-            <a:normAutofit fontScale="90000"/>
-          </a:bodyPr>
+          <a:bodyPr/>
           <a:lstStyle/>
           <a:p>
             <a:r>
               <a:rPr lang="de-DE" dirty="0" smtClean="0"/>
-              <a:t>Persistenz - Kommunikation zur Datenbank</a:t>
+              <a:t>Persistenz - Datenbankmodell</a:t>
             </a:r>
             <a:endParaRPr lang="de-DE" dirty="0"/>
           </a:p>
@@ -3826,7 +3938,7 @@
       </p:sp>
       <p:sp>
         <p:nvSpPr>
-          <p:cNvPr id="3" name="Inhaltsplatzhalter 2"/>
+          <p:cNvPr id="6" name="Inhaltsplatzhalter 5"/>
           <p:cNvSpPr>
             <a:spLocks noGrp="1"/>
           </p:cNvSpPr>
@@ -3839,45 +3951,38 @@
           <a:bodyPr/>
           <a:lstStyle/>
           <a:p>
-            <a:r>
-              <a:rPr lang="de-DE" dirty="0" err="1" smtClean="0"/>
-              <a:t>Hibernate</a:t>
-            </a:r>
-            <a:r>
-              <a:rPr lang="de-DE" dirty="0" smtClean="0"/>
-              <a:t> 4.3.8</a:t>
-            </a:r>
-          </a:p>
-          <a:p>
-            <a:r>
-              <a:rPr lang="de-DE" dirty="0" smtClean="0"/>
-              <a:t>Config.xml</a:t>
-            </a:r>
-          </a:p>
-          <a:p>
-            <a:r>
-              <a:rPr lang="de-DE" dirty="0" smtClean="0"/>
-              <a:t>Model- / </a:t>
-            </a:r>
-            <a:r>
-              <a:rPr lang="de-DE" dirty="0" err="1" smtClean="0"/>
-              <a:t>EntityClass</a:t>
-            </a:r>
-            <a:endParaRPr lang="de-DE" dirty="0" smtClean="0"/>
-          </a:p>
-          <a:p>
-            <a:r>
-              <a:rPr lang="de-DE" dirty="0" err="1" smtClean="0"/>
-              <a:t>AccessClass</a:t>
-            </a:r>
-            <a:endParaRPr lang="de-DE" dirty="0" smtClean="0"/>
-          </a:p>
-        </p:txBody>
-      </p:sp>
+            <a:endParaRPr lang="de-DE"/>
+          </a:p>
+        </p:txBody>
+      </p:sp>
+      <p:pic>
+        <p:nvPicPr>
+          <p:cNvPr id="7" name="Grafik 6"/>
+          <p:cNvPicPr>
+            <a:picLocks noChangeAspect="1"/>
+          </p:cNvPicPr>
+          <p:nvPr/>
+        </p:nvPicPr>
+        <p:blipFill>
+          <a:blip r:embed="rId2"/>
+          <a:stretch>
+            <a:fillRect/>
+          </a:stretch>
+        </p:blipFill>
+        <p:spPr>
+          <a:xfrm>
+            <a:off x="35496" y="1962712"/>
+            <a:ext cx="9082513" cy="3803590"/>
+          </a:xfrm>
+          <a:prstGeom prst="rect">
+            <a:avLst/>
+          </a:prstGeom>
+        </p:spPr>
+      </p:pic>
     </p:spTree>
     <p:extLst>
       <p:ext uri="{BB962C8B-B14F-4D97-AF65-F5344CB8AC3E}">
-        <p14:creationId xmlns:p14="http://schemas.microsoft.com/office/powerpoint/2010/main" val="1052338962"/>
+        <p14:creationId xmlns:p14="http://schemas.microsoft.com/office/powerpoint/2010/main" val="3132773705"/>
       </p:ext>
     </p:extLst>
   </p:cSld>
@@ -3924,13 +4029,13 @@
         <p:spPr/>
         <p:txBody>
           <a:bodyPr>
-            <a:normAutofit/>
+            <a:normAutofit fontScale="90000"/>
           </a:bodyPr>
           <a:lstStyle/>
           <a:p>
             <a:r>
               <a:rPr lang="de-DE" dirty="0" smtClean="0"/>
-              <a:t>Sicherheit - Session Management</a:t>
+              <a:t>Persistenz - Kommunikation zur Datenbank</a:t>
             </a:r>
             <a:endParaRPr lang="de-DE" dirty="0"/>
           </a:p>
@@ -3951,14 +4056,45 @@
           <a:bodyPr/>
           <a:lstStyle/>
           <a:p>
-            <a:endParaRPr lang="de-DE" dirty="0"/>
+            <a:r>
+              <a:rPr lang="de-DE" dirty="0" err="1" smtClean="0"/>
+              <a:t>Hibernate</a:t>
+            </a:r>
+            <a:r>
+              <a:rPr lang="de-DE" dirty="0" smtClean="0"/>
+              <a:t> 4.3.8</a:t>
+            </a:r>
+          </a:p>
+          <a:p>
+            <a:r>
+              <a:rPr lang="de-DE" dirty="0" smtClean="0"/>
+              <a:t>Config.xml</a:t>
+            </a:r>
+          </a:p>
+          <a:p>
+            <a:r>
+              <a:rPr lang="de-DE" dirty="0" smtClean="0"/>
+              <a:t>Model- / </a:t>
+            </a:r>
+            <a:r>
+              <a:rPr lang="de-DE" dirty="0" err="1" smtClean="0"/>
+              <a:t>EntityClass</a:t>
+            </a:r>
+            <a:endParaRPr lang="de-DE" dirty="0" smtClean="0"/>
+          </a:p>
+          <a:p>
+            <a:r>
+              <a:rPr lang="de-DE" dirty="0" err="1" smtClean="0"/>
+              <a:t>AccessClass</a:t>
+            </a:r>
+            <a:endParaRPr lang="de-DE" dirty="0" smtClean="0"/>
           </a:p>
         </p:txBody>
       </p:sp>
     </p:spTree>
     <p:extLst>
       <p:ext uri="{BB962C8B-B14F-4D97-AF65-F5344CB8AC3E}">
-        <p14:creationId xmlns:p14="http://schemas.microsoft.com/office/powerpoint/2010/main" val="1033758870"/>
+        <p14:creationId xmlns:p14="http://schemas.microsoft.com/office/powerpoint/2010/main" val="1052338962"/>
       </p:ext>
     </p:extLst>
   </p:cSld>
@@ -4011,7 +4147,7 @@
           <a:p>
             <a:r>
               <a:rPr lang="de-DE" dirty="0" smtClean="0"/>
-              <a:t>Sicherheit - Authentisierung</a:t>
+              <a:t>Sicherheit - Session Management</a:t>
             </a:r>
             <a:endParaRPr lang="de-DE" dirty="0"/>
           </a:p>
@@ -4039,7 +4175,7 @@
     </p:spTree>
     <p:extLst>
       <p:ext uri="{BB962C8B-B14F-4D97-AF65-F5344CB8AC3E}">
-        <p14:creationId xmlns:p14="http://schemas.microsoft.com/office/powerpoint/2010/main" val="1644419537"/>
+        <p14:creationId xmlns:p14="http://schemas.microsoft.com/office/powerpoint/2010/main" val="1033758870"/>
       </p:ext>
     </p:extLst>
   </p:cSld>
@@ -4085,12 +4221,14 @@
         </p:nvSpPr>
         <p:spPr/>
         <p:txBody>
-          <a:bodyPr/>
+          <a:bodyPr>
+            <a:normAutofit/>
+          </a:bodyPr>
           <a:lstStyle/>
           <a:p>
             <a:r>
               <a:rPr lang="de-DE" dirty="0" smtClean="0"/>
-              <a:t>Usability</a:t>
+              <a:t>Sicherheit - Authentisierung</a:t>
             </a:r>
             <a:endParaRPr lang="de-DE" dirty="0"/>
           </a:p>
@@ -4110,24 +4248,6 @@
         <p:txBody>
           <a:bodyPr/>
           <a:lstStyle/>
-          <a:p>
-            <a:r>
-              <a:rPr lang="de-DE" dirty="0" smtClean="0"/>
-              <a:t>Einheitliches Design</a:t>
-            </a:r>
-          </a:p>
-          <a:p>
-            <a:r>
-              <a:rPr lang="de-DE" dirty="0" smtClean="0"/>
-              <a:t>Übersichtlichkeit</a:t>
-            </a:r>
-          </a:p>
-          <a:p>
-            <a:r>
-              <a:rPr lang="de-DE" dirty="0" smtClean="0"/>
-              <a:t>Einfachheit</a:t>
-            </a:r>
-          </a:p>
           <a:p>
             <a:endParaRPr lang="de-DE" dirty="0"/>
           </a:p>
@@ -4136,7 +4256,7 @@
     </p:spTree>
     <p:extLst>
       <p:ext uri="{BB962C8B-B14F-4D97-AF65-F5344CB8AC3E}">
-        <p14:creationId xmlns:p14="http://schemas.microsoft.com/office/powerpoint/2010/main" val="1418243256"/>
+        <p14:creationId xmlns:p14="http://schemas.microsoft.com/office/powerpoint/2010/main" val="1644419537"/>
       </p:ext>
     </p:extLst>
   </p:cSld>

</xml_diff>